<commit_message>
Document / Cache / LaravelMix
전반적인 배경 지식 학습 및 간단한 실습
2018-05-24
</commit_message>
<xml_diff>
--- a/Monthly Plan.pptx
+++ b/Monthly Plan.pptx
@@ -195,7 +195,7 @@
           <a:p>
             <a:fld id="{E1E76E78-0C2A-445E-B35D-3ADF0836B2B3}" type="datetimeFigureOut">
               <a:rPr lang="ko-KR" altLang="en-US" smtClean="0"/>
-              <a:t>2018-05-22</a:t>
+              <a:t>2018-05-24</a:t>
             </a:fld>
             <a:endParaRPr lang="ko-KR" altLang="en-US"/>
           </a:p>
@@ -812,7 +812,7 @@
           <a:p>
             <a:fld id="{48C2848A-6F74-48C5-A4CD-91F929EC3187}" type="datetimeFigureOut">
               <a:rPr lang="ko-KR" altLang="en-US" smtClean="0"/>
-              <a:t>2018-05-22</a:t>
+              <a:t>2018-05-24</a:t>
             </a:fld>
             <a:endParaRPr lang="ko-KR" altLang="en-US"/>
           </a:p>
@@ -982,7 +982,7 @@
           <a:p>
             <a:fld id="{48C2848A-6F74-48C5-A4CD-91F929EC3187}" type="datetimeFigureOut">
               <a:rPr lang="ko-KR" altLang="en-US" smtClean="0"/>
-              <a:t>2018-05-22</a:t>
+              <a:t>2018-05-24</a:t>
             </a:fld>
             <a:endParaRPr lang="ko-KR" altLang="en-US"/>
           </a:p>
@@ -1162,7 +1162,7 @@
           <a:p>
             <a:fld id="{48C2848A-6F74-48C5-A4CD-91F929EC3187}" type="datetimeFigureOut">
               <a:rPr lang="ko-KR" altLang="en-US" smtClean="0"/>
-              <a:t>2018-05-22</a:t>
+              <a:t>2018-05-24</a:t>
             </a:fld>
             <a:endParaRPr lang="ko-KR" altLang="en-US"/>
           </a:p>
@@ -1332,7 +1332,7 @@
           <a:p>
             <a:fld id="{48C2848A-6F74-48C5-A4CD-91F929EC3187}" type="datetimeFigureOut">
               <a:rPr lang="ko-KR" altLang="en-US" smtClean="0"/>
-              <a:t>2018-05-22</a:t>
+              <a:t>2018-05-24</a:t>
             </a:fld>
             <a:endParaRPr lang="ko-KR" altLang="en-US"/>
           </a:p>
@@ -1578,7 +1578,7 @@
           <a:p>
             <a:fld id="{48C2848A-6F74-48C5-A4CD-91F929EC3187}" type="datetimeFigureOut">
               <a:rPr lang="ko-KR" altLang="en-US" smtClean="0"/>
-              <a:t>2018-05-22</a:t>
+              <a:t>2018-05-24</a:t>
             </a:fld>
             <a:endParaRPr lang="ko-KR" altLang="en-US"/>
           </a:p>
@@ -1866,7 +1866,7 @@
           <a:p>
             <a:fld id="{48C2848A-6F74-48C5-A4CD-91F929EC3187}" type="datetimeFigureOut">
               <a:rPr lang="ko-KR" altLang="en-US" smtClean="0"/>
-              <a:t>2018-05-22</a:t>
+              <a:t>2018-05-24</a:t>
             </a:fld>
             <a:endParaRPr lang="ko-KR" altLang="en-US"/>
           </a:p>
@@ -2288,7 +2288,7 @@
           <a:p>
             <a:fld id="{48C2848A-6F74-48C5-A4CD-91F929EC3187}" type="datetimeFigureOut">
               <a:rPr lang="ko-KR" altLang="en-US" smtClean="0"/>
-              <a:t>2018-05-22</a:t>
+              <a:t>2018-05-24</a:t>
             </a:fld>
             <a:endParaRPr lang="ko-KR" altLang="en-US"/>
           </a:p>
@@ -2406,7 +2406,7 @@
           <a:p>
             <a:fld id="{48C2848A-6F74-48C5-A4CD-91F929EC3187}" type="datetimeFigureOut">
               <a:rPr lang="ko-KR" altLang="en-US" smtClean="0"/>
-              <a:t>2018-05-22</a:t>
+              <a:t>2018-05-24</a:t>
             </a:fld>
             <a:endParaRPr lang="ko-KR" altLang="en-US"/>
           </a:p>
@@ -2501,7 +2501,7 @@
           <a:p>
             <a:fld id="{48C2848A-6F74-48C5-A4CD-91F929EC3187}" type="datetimeFigureOut">
               <a:rPr lang="ko-KR" altLang="en-US" smtClean="0"/>
-              <a:t>2018-05-22</a:t>
+              <a:t>2018-05-24</a:t>
             </a:fld>
             <a:endParaRPr lang="ko-KR" altLang="en-US"/>
           </a:p>
@@ -2778,7 +2778,7 @@
           <a:p>
             <a:fld id="{48C2848A-6F74-48C5-A4CD-91F929EC3187}" type="datetimeFigureOut">
               <a:rPr lang="ko-KR" altLang="en-US" smtClean="0"/>
-              <a:t>2018-05-22</a:t>
+              <a:t>2018-05-24</a:t>
             </a:fld>
             <a:endParaRPr lang="ko-KR" altLang="en-US"/>
           </a:p>
@@ -3031,7 +3031,7 @@
           <a:p>
             <a:fld id="{48C2848A-6F74-48C5-A4CD-91F929EC3187}" type="datetimeFigureOut">
               <a:rPr lang="ko-KR" altLang="en-US" smtClean="0"/>
-              <a:t>2018-05-22</a:t>
+              <a:t>2018-05-24</a:t>
             </a:fld>
             <a:endParaRPr lang="ko-KR" altLang="en-US"/>
           </a:p>
@@ -3244,7 +3244,7 @@
           <a:p>
             <a:fld id="{48C2848A-6F74-48C5-A4CD-91F929EC3187}" type="datetimeFigureOut">
               <a:rPr lang="ko-KR" altLang="en-US" smtClean="0"/>
-              <a:t>2018-05-22</a:t>
+              <a:t>2018-05-24</a:t>
             </a:fld>
             <a:endParaRPr lang="ko-KR" altLang="en-US"/>
           </a:p>
@@ -4664,7 +4664,7 @@
             <p:ph idx="1"/>
             <p:extLst>
               <p:ext uri="{D42A27DB-BD31-4B8C-83A1-F6EECF244321}">
-                <p14:modId xmlns:p14="http://schemas.microsoft.com/office/powerpoint/2010/main" val="2860714258"/>
+                <p14:modId xmlns:p14="http://schemas.microsoft.com/office/powerpoint/2010/main" val="2256046755"/>
               </p:ext>
             </p:extLst>
           </p:nvPr>
@@ -8424,7 +8424,7 @@
                         <a:defRPr/>
                       </a:pPr>
                       <a:r>
-                        <a:rPr lang="en-US" altLang="ko-KR" sz="800" smtClean="0">
+                        <a:rPr lang="en-US" altLang="ko-KR" sz="800" dirty="0" smtClean="0">
                           <a:solidFill>
                             <a:schemeClr val="tx2">
                               <a:lumMod val="40000"/>
@@ -9004,6 +9004,9 @@
                         </a:rPr>
                         <a:t>8</a:t>
                       </a:r>
+                    </a:p>
+                    <a:p>
+                      <a:pPr algn="l" latinLnBrk="1"/>
                       <a:endParaRPr lang="ko-KR" altLang="en-US" sz="800" dirty="0">
                         <a:solidFill>
                           <a:schemeClr val="tx2"/>
@@ -10193,6 +10196,126 @@
                 <a:schemeClr val="tx1"/>
               </a:solidFill>
             </a:endParaRPr>
+          </a:p>
+        </p:txBody>
+      </p:sp>
+      <p:sp>
+        <p:nvSpPr>
+          <p:cNvPr id="33" name="타원 32"/>
+          <p:cNvSpPr/>
+          <p:nvPr/>
+        </p:nvSpPr>
+        <p:spPr>
+          <a:xfrm>
+            <a:off x="3725496" y="4931494"/>
+            <a:ext cx="134193" cy="144016"/>
+          </a:xfrm>
+          <a:prstGeom prst="ellipse">
+            <a:avLst/>
+          </a:prstGeom>
+        </p:spPr>
+        <p:style>
+          <a:lnRef idx="2">
+            <a:schemeClr val="accent1">
+              <a:shade val="50000"/>
+            </a:schemeClr>
+          </a:lnRef>
+          <a:fillRef idx="1">
+            <a:schemeClr val="accent1"/>
+          </a:fillRef>
+          <a:effectRef idx="0">
+            <a:schemeClr val="accent1"/>
+          </a:effectRef>
+          <a:fontRef idx="minor">
+            <a:schemeClr val="lt1"/>
+          </a:fontRef>
+        </p:style>
+        <p:txBody>
+          <a:bodyPr rtlCol="0" anchor="ctr"/>
+          <a:lstStyle/>
+          <a:p>
+            <a:pPr algn="ctr"/>
+            <a:endParaRPr lang="ko-KR" altLang="en-US"/>
+          </a:p>
+        </p:txBody>
+      </p:sp>
+      <p:sp>
+        <p:nvSpPr>
+          <p:cNvPr id="36" name="타원 35"/>
+          <p:cNvSpPr/>
+          <p:nvPr/>
+        </p:nvSpPr>
+        <p:spPr>
+          <a:xfrm>
+            <a:off x="6062863" y="4931494"/>
+            <a:ext cx="134193" cy="144016"/>
+          </a:xfrm>
+          <a:prstGeom prst="ellipse">
+            <a:avLst/>
+          </a:prstGeom>
+        </p:spPr>
+        <p:style>
+          <a:lnRef idx="2">
+            <a:schemeClr val="accent1">
+              <a:shade val="50000"/>
+            </a:schemeClr>
+          </a:lnRef>
+          <a:fillRef idx="1">
+            <a:schemeClr val="accent1"/>
+          </a:fillRef>
+          <a:effectRef idx="0">
+            <a:schemeClr val="accent1"/>
+          </a:effectRef>
+          <a:fontRef idx="minor">
+            <a:schemeClr val="lt1"/>
+          </a:fontRef>
+        </p:style>
+        <p:txBody>
+          <a:bodyPr rtlCol="0" anchor="ctr"/>
+          <a:lstStyle/>
+          <a:p>
+            <a:pPr algn="ctr"/>
+            <a:endParaRPr lang="ko-KR" altLang="en-US"/>
+          </a:p>
+        </p:txBody>
+      </p:sp>
+      <p:sp>
+        <p:nvSpPr>
+          <p:cNvPr id="37" name="타원 36"/>
+          <p:cNvSpPr/>
+          <p:nvPr/>
+        </p:nvSpPr>
+        <p:spPr>
+          <a:xfrm>
+            <a:off x="4950247" y="4956807"/>
+            <a:ext cx="134193" cy="144016"/>
+          </a:xfrm>
+          <a:prstGeom prst="ellipse">
+            <a:avLst/>
+          </a:prstGeom>
+        </p:spPr>
+        <p:style>
+          <a:lnRef idx="2">
+            <a:schemeClr val="accent1">
+              <a:shade val="50000"/>
+            </a:schemeClr>
+          </a:lnRef>
+          <a:fillRef idx="1">
+            <a:schemeClr val="accent1"/>
+          </a:fillRef>
+          <a:effectRef idx="0">
+            <a:schemeClr val="accent1"/>
+          </a:effectRef>
+          <a:fontRef idx="minor">
+            <a:schemeClr val="lt1"/>
+          </a:fontRef>
+        </p:style>
+        <p:txBody>
+          <a:bodyPr rtlCol="0" anchor="ctr"/>
+          <a:lstStyle/>
+          <a:p>
+            <a:pPr algn="ctr"/>
+            <a:endParaRPr lang="ko-KR" altLang="en-US"/>
           </a:p>
         </p:txBody>
       </p:sp>

</xml_diff>

<commit_message>
articles 부분 접근제어, font-awesome 진행중
articles.show.blade 에서  author 일 뿐만 아니라 admin 일 때도 수정, 삭제를
가능하게끔 해줘야 하고(역할에서 저자랑 현재 접속한 유저의 id가 같을 때는 해결이 되었지만 admin일 때도 삭제 가능하게 하는 것은 해결이 안됨. admin인 경우에도 버튼을 노출시키지 않도록 해야함,
또한 font-awesome pencil, delete 등 빠진 부분을 채워야 하고
접근제어 중에서 위에언급한 부분이 해결이 되면 라우트로 접근하는 것도 막아주어야 한다.
</commit_message>
<xml_diff>
--- a/Monthly Plan.pptx
+++ b/Monthly Plan.pptx
@@ -195,7 +195,7 @@
           <a:p>
             <a:fld id="{E1E76E78-0C2A-445E-B35D-3ADF0836B2B3}" type="datetimeFigureOut">
               <a:rPr lang="ko-KR" altLang="en-US" smtClean="0"/>
-              <a:t>2018-05-29</a:t>
+              <a:t>2018-05-31</a:t>
             </a:fld>
             <a:endParaRPr lang="ko-KR" altLang="en-US"/>
           </a:p>
@@ -812,7 +812,7 @@
           <a:p>
             <a:fld id="{48C2848A-6F74-48C5-A4CD-91F929EC3187}" type="datetimeFigureOut">
               <a:rPr lang="ko-KR" altLang="en-US" smtClean="0"/>
-              <a:t>2018-05-29</a:t>
+              <a:t>2018-05-31</a:t>
             </a:fld>
             <a:endParaRPr lang="ko-KR" altLang="en-US"/>
           </a:p>
@@ -982,7 +982,7 @@
           <a:p>
             <a:fld id="{48C2848A-6F74-48C5-A4CD-91F929EC3187}" type="datetimeFigureOut">
               <a:rPr lang="ko-KR" altLang="en-US" smtClean="0"/>
-              <a:t>2018-05-29</a:t>
+              <a:t>2018-05-31</a:t>
             </a:fld>
             <a:endParaRPr lang="ko-KR" altLang="en-US"/>
           </a:p>
@@ -1162,7 +1162,7 @@
           <a:p>
             <a:fld id="{48C2848A-6F74-48C5-A4CD-91F929EC3187}" type="datetimeFigureOut">
               <a:rPr lang="ko-KR" altLang="en-US" smtClean="0"/>
-              <a:t>2018-05-29</a:t>
+              <a:t>2018-05-31</a:t>
             </a:fld>
             <a:endParaRPr lang="ko-KR" altLang="en-US"/>
           </a:p>
@@ -1332,7 +1332,7 @@
           <a:p>
             <a:fld id="{48C2848A-6F74-48C5-A4CD-91F929EC3187}" type="datetimeFigureOut">
               <a:rPr lang="ko-KR" altLang="en-US" smtClean="0"/>
-              <a:t>2018-05-29</a:t>
+              <a:t>2018-05-31</a:t>
             </a:fld>
             <a:endParaRPr lang="ko-KR" altLang="en-US"/>
           </a:p>
@@ -1578,7 +1578,7 @@
           <a:p>
             <a:fld id="{48C2848A-6F74-48C5-A4CD-91F929EC3187}" type="datetimeFigureOut">
               <a:rPr lang="ko-KR" altLang="en-US" smtClean="0"/>
-              <a:t>2018-05-29</a:t>
+              <a:t>2018-05-31</a:t>
             </a:fld>
             <a:endParaRPr lang="ko-KR" altLang="en-US"/>
           </a:p>
@@ -1866,7 +1866,7 @@
           <a:p>
             <a:fld id="{48C2848A-6F74-48C5-A4CD-91F929EC3187}" type="datetimeFigureOut">
               <a:rPr lang="ko-KR" altLang="en-US" smtClean="0"/>
-              <a:t>2018-05-29</a:t>
+              <a:t>2018-05-31</a:t>
             </a:fld>
             <a:endParaRPr lang="ko-KR" altLang="en-US"/>
           </a:p>
@@ -2288,7 +2288,7 @@
           <a:p>
             <a:fld id="{48C2848A-6F74-48C5-A4CD-91F929EC3187}" type="datetimeFigureOut">
               <a:rPr lang="ko-KR" altLang="en-US" smtClean="0"/>
-              <a:t>2018-05-29</a:t>
+              <a:t>2018-05-31</a:t>
             </a:fld>
             <a:endParaRPr lang="ko-KR" altLang="en-US"/>
           </a:p>
@@ -2406,7 +2406,7 @@
           <a:p>
             <a:fld id="{48C2848A-6F74-48C5-A4CD-91F929EC3187}" type="datetimeFigureOut">
               <a:rPr lang="ko-KR" altLang="en-US" smtClean="0"/>
-              <a:t>2018-05-29</a:t>
+              <a:t>2018-05-31</a:t>
             </a:fld>
             <a:endParaRPr lang="ko-KR" altLang="en-US"/>
           </a:p>
@@ -2501,7 +2501,7 @@
           <a:p>
             <a:fld id="{48C2848A-6F74-48C5-A4CD-91F929EC3187}" type="datetimeFigureOut">
               <a:rPr lang="ko-KR" altLang="en-US" smtClean="0"/>
-              <a:t>2018-05-29</a:t>
+              <a:t>2018-05-31</a:t>
             </a:fld>
             <a:endParaRPr lang="ko-KR" altLang="en-US"/>
           </a:p>
@@ -2778,7 +2778,7 @@
           <a:p>
             <a:fld id="{48C2848A-6F74-48C5-A4CD-91F929EC3187}" type="datetimeFigureOut">
               <a:rPr lang="ko-KR" altLang="en-US" smtClean="0"/>
-              <a:t>2018-05-29</a:t>
+              <a:t>2018-05-31</a:t>
             </a:fld>
             <a:endParaRPr lang="ko-KR" altLang="en-US"/>
           </a:p>
@@ -3031,7 +3031,7 @@
           <a:p>
             <a:fld id="{48C2848A-6F74-48C5-A4CD-91F929EC3187}" type="datetimeFigureOut">
               <a:rPr lang="ko-KR" altLang="en-US" smtClean="0"/>
-              <a:t>2018-05-29</a:t>
+              <a:t>2018-05-31</a:t>
             </a:fld>
             <a:endParaRPr lang="ko-KR" altLang="en-US"/>
           </a:p>
@@ -3244,7 +3244,7 @@
           <a:p>
             <a:fld id="{48C2848A-6F74-48C5-A4CD-91F929EC3187}" type="datetimeFigureOut">
               <a:rPr lang="ko-KR" altLang="en-US" smtClean="0"/>
-              <a:t>2018-05-29</a:t>
+              <a:t>2018-05-31</a:t>
             </a:fld>
             <a:endParaRPr lang="ko-KR" altLang="en-US"/>
           </a:p>
@@ -4664,14 +4664,14 @@
             <p:ph idx="1"/>
             <p:extLst>
               <p:ext uri="{D42A27DB-BD31-4B8C-83A1-F6EECF244321}">
-                <p14:modId xmlns:p14="http://schemas.microsoft.com/office/powerpoint/2010/main" val="2982294517"/>
+                <p14:modId xmlns:p14="http://schemas.microsoft.com/office/powerpoint/2010/main" val="2533807802"/>
               </p:ext>
             </p:extLst>
           </p:nvPr>
         </p:nvGraphicFramePr>
         <p:xfrm>
           <a:off x="457200" y="836712"/>
-          <a:ext cx="8229599" cy="5751944"/>
+          <a:ext cx="8229599" cy="5750167"/>
         </p:xfrm>
         <a:graphic>
           <a:graphicData uri="http://schemas.openxmlformats.org/drawingml/2006/table">
@@ -8772,7 +8772,7 @@
                             <a:schemeClr val="tx2"/>
                           </a:solidFill>
                         </a:rPr>
-                        <a:t>모델정복</a:t>
+                        <a:t>모델학습</a:t>
                       </a:r>
                       <a:endParaRPr lang="en-US" altLang="ko-KR" sz="800" baseline="0" dirty="0" smtClean="0">
                         <a:solidFill>
@@ -8842,7 +8842,7 @@
                             <a:schemeClr val="tx2"/>
                           </a:solidFill>
                         </a:rPr>
-                        <a:t>Article + tag </a:t>
+                        <a:t>Article</a:t>
                       </a:r>
                       <a:r>
                         <a:rPr lang="ko-KR" altLang="en-US" sz="800" dirty="0" smtClean="0">
@@ -8850,16 +8850,40 @@
                             <a:schemeClr val="tx2"/>
                           </a:solidFill>
                         </a:rPr>
-                        <a:t>기능 구현</a:t>
-                      </a:r>
-                      <a:endParaRPr lang="en-US" altLang="ko-KR" sz="800" dirty="0" smtClean="0">
-                        <a:solidFill>
-                          <a:schemeClr val="tx2"/>
-                        </a:solidFill>
-                      </a:endParaRPr>
-                    </a:p>
-                    <a:p>
-                      <a:pPr algn="ctr" latinLnBrk="1"/>
+                        <a:t>구현</a:t>
+                      </a:r>
+                      <a:r>
+                        <a:rPr lang="en-US" altLang="ko-KR" sz="800" dirty="0" smtClean="0">
+                          <a:solidFill>
+                            <a:schemeClr val="tx2"/>
+                          </a:solidFill>
+                        </a:rPr>
+                        <a:t>(Markdown</a:t>
+                      </a:r>
+                      <a:r>
+                        <a:rPr lang="en-US" altLang="ko-KR" sz="800" baseline="0" dirty="0" smtClean="0">
+                          <a:solidFill>
+                            <a:schemeClr val="tx2"/>
+                          </a:solidFill>
+                        </a:rPr>
+                        <a:t> + font-awesome </a:t>
+                      </a:r>
+                      <a:r>
+                        <a:rPr lang="en-US" altLang="ko-KR" sz="800" baseline="0" dirty="0" err="1" smtClean="0">
+                          <a:solidFill>
+                            <a:schemeClr val="tx2"/>
+                          </a:solidFill>
+                        </a:rPr>
+                        <a:t>Laravel</a:t>
+                      </a:r>
+                      <a:r>
+                        <a:rPr lang="en-US" altLang="ko-KR" sz="800" baseline="0" dirty="0" smtClean="0">
+                          <a:solidFill>
+                            <a:schemeClr val="tx2"/>
+                          </a:solidFill>
+                        </a:rPr>
+                        <a:t> Mix)</a:t>
+                      </a:r>
                       <a:endParaRPr lang="en-US" altLang="ko-KR" sz="800" dirty="0" smtClean="0">
                         <a:solidFill>
                           <a:schemeClr val="tx2"/>
@@ -8928,7 +8952,7 @@
                             <a:schemeClr val="tx2"/>
                           </a:solidFill>
                         </a:rPr>
-                        <a:t>Attachment </a:t>
+                        <a:t>Tag</a:t>
                       </a:r>
                       <a:r>
                         <a:rPr lang="ko-KR" altLang="en-US" sz="800" dirty="0" smtClean="0">
@@ -8967,12 +8991,20 @@
                     <a:p>
                       <a:pPr algn="l" latinLnBrk="1"/>
                       <a:r>
-                        <a:rPr lang="ko-KR" altLang="en-US" sz="800" dirty="0" err="1" smtClean="0">
+                        <a:rPr lang="en-US" altLang="ko-KR" sz="800" dirty="0" smtClean="0">
                           <a:solidFill>
                             <a:schemeClr val="tx2"/>
                           </a:solidFill>
                         </a:rPr>
-                        <a:t>리팩토링</a:t>
+                        <a:t>Tag</a:t>
+                      </a:r>
+                      <a:r>
+                        <a:rPr lang="ko-KR" altLang="en-US" sz="800" dirty="0" smtClean="0">
+                          <a:solidFill>
+                            <a:schemeClr val="tx2"/>
+                          </a:solidFill>
+                        </a:rPr>
+                        <a:t>구현</a:t>
                       </a:r>
                       <a:endParaRPr lang="en-US" altLang="ko-KR" sz="800" dirty="0" smtClean="0">
                         <a:solidFill>
@@ -9014,7 +9046,7 @@
                             <a:schemeClr val="tx2"/>
                           </a:solidFill>
                         </a:rPr>
-                        <a:t> </a:t>
+                        <a:t> 참고 </a:t>
                       </a:r>
                       <a:r>
                         <a:rPr lang="en-US" altLang="ko-KR" sz="800" dirty="0" smtClean="0">
@@ -9022,7 +9054,15 @@
                             <a:schemeClr val="tx2"/>
                           </a:solidFill>
                         </a:rPr>
-                        <a:t>+ comment</a:t>
+                        <a:t>+ </a:t>
+                      </a:r>
+                      <a:r>
+                        <a:rPr lang="en-US" altLang="ko-KR" sz="800" dirty="0" smtClean="0">
+                          <a:solidFill>
+                            <a:schemeClr val="tx2"/>
+                          </a:solidFill>
+                        </a:rPr>
+                        <a:t>Comment</a:t>
                       </a:r>
                       <a:endParaRPr lang="ko-KR" altLang="en-US" sz="800" dirty="0">
                         <a:solidFill>
@@ -9333,6 +9373,22 @@
                           </a:solidFill>
                         </a:rPr>
                         <a:t>제출</a:t>
+                      </a:r>
+                      <a:endParaRPr lang="en-US" altLang="ko-KR" sz="800" dirty="0" smtClean="0">
+                        <a:solidFill>
+                          <a:schemeClr val="tx2"/>
+                        </a:solidFill>
+                      </a:endParaRPr>
+                    </a:p>
+                    <a:p>
+                      <a:pPr latinLnBrk="1"/>
+                      <a:r>
+                        <a:rPr lang="ko-KR" altLang="en-US" sz="800" smtClean="0">
+                          <a:solidFill>
+                            <a:schemeClr val="tx2"/>
+                          </a:solidFill>
+                        </a:rPr>
+                        <a:t>마감일</a:t>
                       </a:r>
                       <a:endParaRPr lang="ko-KR" altLang="en-US" sz="800" dirty="0">
                         <a:solidFill>
@@ -10588,7 +10644,7 @@
         </p:nvSpPr>
         <p:spPr>
           <a:xfrm>
-            <a:off x="6062863" y="4931494"/>
+            <a:off x="6042673" y="4956807"/>
             <a:ext cx="134193" cy="144016"/>
           </a:xfrm>
           <a:prstGeom prst="ellipse">
@@ -10668,8 +10724,8 @@
         </p:nvSpPr>
         <p:spPr>
           <a:xfrm>
-            <a:off x="7230940" y="4920803"/>
-            <a:ext cx="216024" cy="216024"/>
+            <a:off x="7230940" y="4956807"/>
+            <a:ext cx="178001" cy="144016"/>
           </a:xfrm>
           <a:prstGeom prst="flowChartExtract">
             <a:avLst/>
@@ -10708,10 +10764,50 @@
         </p:nvSpPr>
         <p:spPr>
           <a:xfrm>
-            <a:off x="8388424" y="4902299"/>
-            <a:ext cx="216024" cy="216024"/>
+            <a:off x="8388560" y="4927613"/>
+            <a:ext cx="215888" cy="173210"/>
           </a:xfrm>
           <a:prstGeom prst="flowChartExtract">
+            <a:avLst/>
+          </a:prstGeom>
+        </p:spPr>
+        <p:style>
+          <a:lnRef idx="2">
+            <a:schemeClr val="accent1">
+              <a:shade val="50000"/>
+            </a:schemeClr>
+          </a:lnRef>
+          <a:fillRef idx="1">
+            <a:schemeClr val="accent1"/>
+          </a:fillRef>
+          <a:effectRef idx="0">
+            <a:schemeClr val="accent1"/>
+          </a:effectRef>
+          <a:fontRef idx="minor">
+            <a:schemeClr val="lt1"/>
+          </a:fontRef>
+        </p:style>
+        <p:txBody>
+          <a:bodyPr rtlCol="0" anchor="ctr"/>
+          <a:lstStyle/>
+          <a:p>
+            <a:pPr algn="ctr"/>
+            <a:endParaRPr lang="ko-KR" altLang="en-US"/>
+          </a:p>
+        </p:txBody>
+      </p:sp>
+      <p:sp>
+        <p:nvSpPr>
+          <p:cNvPr id="38" name="타원 37"/>
+          <p:cNvSpPr/>
+          <p:nvPr/>
+        </p:nvSpPr>
+        <p:spPr>
+          <a:xfrm>
+            <a:off x="3728977" y="5373216"/>
+            <a:ext cx="127229" cy="132461"/>
+          </a:xfrm>
+          <a:prstGeom prst="ellipse">
             <a:avLst/>
           </a:prstGeom>
         </p:spPr>

</xml_diff>